<commit_message>
New results and file reorganization
</commit_message>
<xml_diff>
--- a/new results.pptx
+++ b/new results.pptx
@@ -5,7 +5,7 @@
     <p:sldMasterId id="2147483648" r:id="rId1"/>
   </p:sldMasterIdLst>
   <p:notesMasterIdLst>
-    <p:notesMasterId r:id="rId13"/>
+    <p:notesMasterId r:id="rId14"/>
   </p:notesMasterIdLst>
   <p:sldIdLst>
     <p:sldId id="309" r:id="rId2"/>
@@ -19,6 +19,7 @@
     <p:sldId id="314" r:id="rId10"/>
     <p:sldId id="261" r:id="rId11"/>
     <p:sldId id="315" r:id="rId12"/>
+    <p:sldId id="316" r:id="rId13"/>
   </p:sldIdLst>
   <p:sldSz cx="12192000" cy="6858000"/>
   <p:notesSz cx="6858000" cy="9144000"/>
@@ -207,7 +208,7 @@
           <a:p>
             <a:fld id="{4543A3A9-CBF7-3D4B-AD57-D218981C1820}" type="datetimeFigureOut">
               <a:rPr lang="en-US" smtClean="0"/>
-              <a:t>7/2/21</a:t>
+              <a:t>7/21/21</a:t>
             </a:fld>
             <a:endParaRPr lang="en-US"/>
           </a:p>
@@ -795,7 +796,7 @@
           <a:p>
             <a:fld id="{E9F44119-0174-E745-9662-06438F1C59C4}" type="datetimeFigureOut">
               <a:rPr lang="en-US" smtClean="0"/>
-              <a:t>7/2/21</a:t>
+              <a:t>7/21/21</a:t>
             </a:fld>
             <a:endParaRPr lang="en-US"/>
           </a:p>
@@ -993,7 +994,7 @@
           <a:p>
             <a:fld id="{E9F44119-0174-E745-9662-06438F1C59C4}" type="datetimeFigureOut">
               <a:rPr lang="en-US" smtClean="0"/>
-              <a:t>7/2/21</a:t>
+              <a:t>7/21/21</a:t>
             </a:fld>
             <a:endParaRPr lang="en-US"/>
           </a:p>
@@ -1201,7 +1202,7 @@
           <a:p>
             <a:fld id="{E9F44119-0174-E745-9662-06438F1C59C4}" type="datetimeFigureOut">
               <a:rPr lang="en-US" smtClean="0"/>
-              <a:t>7/2/21</a:t>
+              <a:t>7/21/21</a:t>
             </a:fld>
             <a:endParaRPr lang="en-US"/>
           </a:p>
@@ -1399,7 +1400,7 @@
           <a:p>
             <a:fld id="{E9F44119-0174-E745-9662-06438F1C59C4}" type="datetimeFigureOut">
               <a:rPr lang="en-US" smtClean="0"/>
-              <a:t>7/2/21</a:t>
+              <a:t>7/21/21</a:t>
             </a:fld>
             <a:endParaRPr lang="en-US"/>
           </a:p>
@@ -1674,7 +1675,7 @@
           <a:p>
             <a:fld id="{E9F44119-0174-E745-9662-06438F1C59C4}" type="datetimeFigureOut">
               <a:rPr lang="en-US" smtClean="0"/>
-              <a:t>7/2/21</a:t>
+              <a:t>7/21/21</a:t>
             </a:fld>
             <a:endParaRPr lang="en-US"/>
           </a:p>
@@ -1939,7 +1940,7 @@
           <a:p>
             <a:fld id="{E9F44119-0174-E745-9662-06438F1C59C4}" type="datetimeFigureOut">
               <a:rPr lang="en-US" smtClean="0"/>
-              <a:t>7/2/21</a:t>
+              <a:t>7/21/21</a:t>
             </a:fld>
             <a:endParaRPr lang="en-US"/>
           </a:p>
@@ -2351,7 +2352,7 @@
           <a:p>
             <a:fld id="{E9F44119-0174-E745-9662-06438F1C59C4}" type="datetimeFigureOut">
               <a:rPr lang="en-US" smtClean="0"/>
-              <a:t>7/2/21</a:t>
+              <a:t>7/21/21</a:t>
             </a:fld>
             <a:endParaRPr lang="en-US"/>
           </a:p>
@@ -2492,7 +2493,7 @@
           <a:p>
             <a:fld id="{E9F44119-0174-E745-9662-06438F1C59C4}" type="datetimeFigureOut">
               <a:rPr lang="en-US" smtClean="0"/>
-              <a:t>7/2/21</a:t>
+              <a:t>7/21/21</a:t>
             </a:fld>
             <a:endParaRPr lang="en-US"/>
           </a:p>
@@ -2605,7 +2606,7 @@
           <a:p>
             <a:fld id="{E9F44119-0174-E745-9662-06438F1C59C4}" type="datetimeFigureOut">
               <a:rPr lang="en-US" smtClean="0"/>
-              <a:t>7/2/21</a:t>
+              <a:t>7/21/21</a:t>
             </a:fld>
             <a:endParaRPr lang="en-US"/>
           </a:p>
@@ -2916,7 +2917,7 @@
           <a:p>
             <a:fld id="{E9F44119-0174-E745-9662-06438F1C59C4}" type="datetimeFigureOut">
               <a:rPr lang="en-US" smtClean="0"/>
-              <a:t>7/2/21</a:t>
+              <a:t>7/21/21</a:t>
             </a:fld>
             <a:endParaRPr lang="en-US"/>
           </a:p>
@@ -3204,7 +3205,7 @@
           <a:p>
             <a:fld id="{E9F44119-0174-E745-9662-06438F1C59C4}" type="datetimeFigureOut">
               <a:rPr lang="en-US" smtClean="0"/>
-              <a:t>7/2/21</a:t>
+              <a:t>7/21/21</a:t>
             </a:fld>
             <a:endParaRPr lang="en-US"/>
           </a:p>
@@ -3445,7 +3446,7 @@
           <a:p>
             <a:fld id="{E9F44119-0174-E745-9662-06438F1C59C4}" type="datetimeFigureOut">
               <a:rPr lang="en-US" smtClean="0"/>
-              <a:t>7/2/21</a:t>
+              <a:t>7/21/21</a:t>
             </a:fld>
             <a:endParaRPr lang="en-US"/>
           </a:p>
@@ -5346,6 +5347,149 @@
     <p:extLst>
       <p:ext uri="{BB962C8B-B14F-4D97-AF65-F5344CB8AC3E}">
         <p14:creationId xmlns:p14="http://schemas.microsoft.com/office/powerpoint/2010/main" val="2597511832"/>
+      </p:ext>
+    </p:extLst>
+  </p:cSld>
+  <p:clrMapOvr>
+    <a:masterClrMapping/>
+  </p:clrMapOvr>
+</p:sld>
+</file>
+
+<file path=ppt/slides/slide12.xml><?xml version="1.0" encoding="utf-8"?>
+<p:sld xmlns:a="http://schemas.openxmlformats.org/drawingml/2006/main" xmlns:r="http://schemas.openxmlformats.org/officeDocument/2006/relationships" xmlns:p="http://schemas.openxmlformats.org/presentationml/2006/main">
+  <p:cSld>
+    <p:spTree>
+      <p:nvGrpSpPr>
+        <p:cNvPr id="1" name=""/>
+        <p:cNvGrpSpPr/>
+        <p:nvPr/>
+      </p:nvGrpSpPr>
+      <p:grpSpPr>
+        <a:xfrm>
+          <a:off x="0" y="0"/>
+          <a:ext cx="0" cy="0"/>
+          <a:chOff x="0" y="0"/>
+          <a:chExt cx="0" cy="0"/>
+        </a:xfrm>
+      </p:grpSpPr>
+      <p:pic>
+        <p:nvPicPr>
+          <p:cNvPr id="3" name="Picture 2">
+            <a:extLst>
+              <a:ext uri="{FF2B5EF4-FFF2-40B4-BE49-F238E27FC236}">
+                <a16:creationId xmlns:a16="http://schemas.microsoft.com/office/drawing/2014/main" id="{C2C69C12-ED32-724B-8C1D-47077D26311E}"/>
+              </a:ext>
+            </a:extLst>
+          </p:cNvPr>
+          <p:cNvPicPr>
+            <a:picLocks noChangeAspect="1"/>
+          </p:cNvPicPr>
+          <p:nvPr/>
+        </p:nvPicPr>
+        <p:blipFill>
+          <a:blip r:embed="rId2"/>
+          <a:stretch>
+            <a:fillRect/>
+          </a:stretch>
+        </p:blipFill>
+        <p:spPr>
+          <a:xfrm>
+            <a:off x="2895600" y="228600"/>
+            <a:ext cx="6400800" cy="6400800"/>
+          </a:xfrm>
+          <a:prstGeom prst="rect">
+            <a:avLst/>
+          </a:prstGeom>
+        </p:spPr>
+      </p:pic>
+      <p:sp>
+        <p:nvSpPr>
+          <p:cNvPr id="4" name="TextBox 3">
+            <a:extLst>
+              <a:ext uri="{FF2B5EF4-FFF2-40B4-BE49-F238E27FC236}">
+                <a16:creationId xmlns:a16="http://schemas.microsoft.com/office/drawing/2014/main" id="{E6201B27-5E5B-794C-8781-78F6B0817298}"/>
+              </a:ext>
+            </a:extLst>
+          </p:cNvPr>
+          <p:cNvSpPr txBox="1"/>
+          <p:nvPr/>
+        </p:nvSpPr>
+        <p:spPr>
+          <a:xfrm>
+            <a:off x="4614530" y="1350334"/>
+            <a:ext cx="1605516" cy="369332"/>
+          </a:xfrm>
+          <a:prstGeom prst="rect">
+            <a:avLst/>
+          </a:prstGeom>
+          <a:noFill/>
+        </p:spPr>
+        <p:txBody>
+          <a:bodyPr wrap="square" rtlCol="0">
+            <a:spAutoFit/>
+          </a:bodyPr>
+          <a:lstStyle/>
+          <a:p>
+            <a:r>
+              <a:rPr lang="en-US" dirty="0">
+                <a:solidFill>
+                  <a:schemeClr val="accent6">
+                    <a:lumMod val="50000"/>
+                  </a:schemeClr>
+                </a:solidFill>
+              </a:rPr>
+              <a:t>Kappa = 8</a:t>
+            </a:r>
+          </a:p>
+        </p:txBody>
+      </p:sp>
+      <p:sp>
+        <p:nvSpPr>
+          <p:cNvPr id="5" name="TextBox 4">
+            <a:extLst>
+              <a:ext uri="{FF2B5EF4-FFF2-40B4-BE49-F238E27FC236}">
+                <a16:creationId xmlns:a16="http://schemas.microsoft.com/office/drawing/2014/main" id="{3C9B7DDA-7114-BB4E-88FC-9471BF75B0D7}"/>
+              </a:ext>
+            </a:extLst>
+          </p:cNvPr>
+          <p:cNvSpPr txBox="1"/>
+          <p:nvPr/>
+        </p:nvSpPr>
+        <p:spPr>
+          <a:xfrm>
+            <a:off x="4614530" y="2746744"/>
+            <a:ext cx="1605516" cy="369332"/>
+          </a:xfrm>
+          <a:prstGeom prst="rect">
+            <a:avLst/>
+          </a:prstGeom>
+          <a:noFill/>
+        </p:spPr>
+        <p:txBody>
+          <a:bodyPr wrap="square" rtlCol="0">
+            <a:spAutoFit/>
+          </a:bodyPr>
+          <a:lstStyle/>
+          <a:p>
+            <a:r>
+              <a:rPr lang="en-US" dirty="0">
+                <a:solidFill>
+                  <a:schemeClr val="accent6">
+                    <a:lumMod val="60000"/>
+                    <a:lumOff val="40000"/>
+                  </a:schemeClr>
+                </a:solidFill>
+              </a:rPr>
+              <a:t>Kappa = 2</a:t>
+            </a:r>
+          </a:p>
+        </p:txBody>
+      </p:sp>
+    </p:spTree>
+    <p:extLst>
+      <p:ext uri="{BB962C8B-B14F-4D97-AF65-F5344CB8AC3E}">
+        <p14:creationId xmlns:p14="http://schemas.microsoft.com/office/powerpoint/2010/main" val="1182921063"/>
       </p:ext>
     </p:extLst>
   </p:cSld>

</xml_diff>